<commit_message>
PPT topológia kép update
</commit_message>
<xml_diff>
--- a/Projekt.pptx
+++ b/Projekt.pptx
@@ -10,7 +10,8 @@
     <p:sldId id="257" r:id="rId4"/>
     <p:sldId id="258" r:id="rId5"/>
     <p:sldId id="260" r:id="rId6"/>
-    <p:sldId id="259" r:id="rId7"/>
+    <p:sldId id="262" r:id="rId7"/>
+    <p:sldId id="259" r:id="rId8"/>
   </p:sldIdLst>
   <p:sldSz cx="12192000" cy="6858000"/>
   <p:notesSz cx="6858000" cy="9144000"/>
@@ -285,7 +286,7 @@
           <a:p>
             <a:fld id="{317F292F-06F0-410F-8036-6E8B9B0B08EB}" type="datetimeFigureOut">
               <a:rPr lang="hu-HU" smtClean="0"/>
-              <a:t>2023.01.26.</a:t>
+              <a:t>2023.01.27.</a:t>
             </a:fld>
             <a:endParaRPr lang="hu-HU"/>
           </a:p>
@@ -513,7 +514,7 @@
           <a:p>
             <a:fld id="{317F292F-06F0-410F-8036-6E8B9B0B08EB}" type="datetimeFigureOut">
               <a:rPr lang="hu-HU" smtClean="0"/>
-              <a:t>2023.01.26.</a:t>
+              <a:t>2023.01.27.</a:t>
             </a:fld>
             <a:endParaRPr lang="hu-HU"/>
           </a:p>
@@ -693,7 +694,7 @@
           <a:p>
             <a:fld id="{317F292F-06F0-410F-8036-6E8B9B0B08EB}" type="datetimeFigureOut">
               <a:rPr lang="hu-HU" smtClean="0"/>
-              <a:t>2023.01.26.</a:t>
+              <a:t>2023.01.27.</a:t>
             </a:fld>
             <a:endParaRPr lang="hu-HU"/>
           </a:p>
@@ -863,7 +864,7 @@
           <a:p>
             <a:fld id="{317F292F-06F0-410F-8036-6E8B9B0B08EB}" type="datetimeFigureOut">
               <a:rPr lang="hu-HU" smtClean="0"/>
-              <a:t>2023.01.26.</a:t>
+              <a:t>2023.01.27.</a:t>
             </a:fld>
             <a:endParaRPr lang="hu-HU"/>
           </a:p>
@@ -1117,7 +1118,7 @@
           <a:p>
             <a:fld id="{317F292F-06F0-410F-8036-6E8B9B0B08EB}" type="datetimeFigureOut">
               <a:rPr lang="hu-HU" smtClean="0"/>
-              <a:t>2023.01.26.</a:t>
+              <a:t>2023.01.27.</a:t>
             </a:fld>
             <a:endParaRPr lang="hu-HU"/>
           </a:p>
@@ -1443,7 +1444,7 @@
           <a:p>
             <a:fld id="{317F292F-06F0-410F-8036-6E8B9B0B08EB}" type="datetimeFigureOut">
               <a:rPr lang="hu-HU" smtClean="0"/>
-              <a:t>2023.01.26.</a:t>
+              <a:t>2023.01.27.</a:t>
             </a:fld>
             <a:endParaRPr lang="hu-HU"/>
           </a:p>
@@ -1894,7 +1895,7 @@
           <a:p>
             <a:fld id="{317F292F-06F0-410F-8036-6E8B9B0B08EB}" type="datetimeFigureOut">
               <a:rPr lang="hu-HU" smtClean="0"/>
-              <a:t>2023.01.26.</a:t>
+              <a:t>2023.01.27.</a:t>
             </a:fld>
             <a:endParaRPr lang="hu-HU"/>
           </a:p>
@@ -2012,7 +2013,7 @@
           <a:p>
             <a:fld id="{317F292F-06F0-410F-8036-6E8B9B0B08EB}" type="datetimeFigureOut">
               <a:rPr lang="hu-HU" smtClean="0"/>
-              <a:t>2023.01.26.</a:t>
+              <a:t>2023.01.27.</a:t>
             </a:fld>
             <a:endParaRPr lang="hu-HU"/>
           </a:p>
@@ -2107,7 +2108,7 @@
           <a:p>
             <a:fld id="{317F292F-06F0-410F-8036-6E8B9B0B08EB}" type="datetimeFigureOut">
               <a:rPr lang="hu-HU" smtClean="0"/>
-              <a:t>2023.01.26.</a:t>
+              <a:t>2023.01.27.</a:t>
             </a:fld>
             <a:endParaRPr lang="hu-HU"/>
           </a:p>
@@ -2394,7 +2395,7 @@
           <a:p>
             <a:fld id="{317F292F-06F0-410F-8036-6E8B9B0B08EB}" type="datetimeFigureOut">
               <a:rPr lang="hu-HU" smtClean="0"/>
-              <a:t>2023.01.26.</a:t>
+              <a:t>2023.01.27.</a:t>
             </a:fld>
             <a:endParaRPr lang="hu-HU"/>
           </a:p>
@@ -2716,7 +2717,7 @@
           <a:p>
             <a:fld id="{317F292F-06F0-410F-8036-6E8B9B0B08EB}" type="datetimeFigureOut">
               <a:rPr lang="hu-HU" smtClean="0"/>
-              <a:t>2023.01.26.</a:t>
+              <a:t>2023.01.27.</a:t>
             </a:fld>
             <a:endParaRPr lang="hu-HU"/>
           </a:p>
@@ -2970,7 +2971,7 @@
           <a:p>
             <a:fld id="{317F292F-06F0-410F-8036-6E8B9B0B08EB}" type="datetimeFigureOut">
               <a:rPr lang="hu-HU" smtClean="0"/>
-              <a:t>2023.01.26.</a:t>
+              <a:t>2023.01.27.</a:t>
             </a:fld>
             <a:endParaRPr lang="hu-HU"/>
           </a:p>
@@ -4673,40 +4674,6 @@
           </a:p>
         </p:txBody>
       </p:sp>
-      <p:pic>
-        <p:nvPicPr>
-          <p:cNvPr id="5" name="Tartalom helye 4">
-            <a:extLst>
-              <a:ext uri="{FF2B5EF4-FFF2-40B4-BE49-F238E27FC236}">
-                <a16:creationId xmlns:a16="http://schemas.microsoft.com/office/drawing/2014/main" id="{64766749-A76B-41D3-97EF-A97DD8116091}"/>
-              </a:ext>
-            </a:extLst>
-          </p:cNvPr>
-          <p:cNvPicPr>
-            <a:picLocks noGrp="1" noChangeAspect="1"/>
-          </p:cNvPicPr>
-          <p:nvPr>
-            <p:ph idx="1"/>
-          </p:nvPr>
-        </p:nvPicPr>
-        <p:blipFill rotWithShape="1">
-          <a:blip r:embed="rId2">
-            <a:extLst>
-              <a:ext uri="{28A0092B-C50C-407E-A947-70E740481C1C}">
-                <a14:useLocalDpi xmlns:a14="http://schemas.microsoft.com/office/drawing/2010/main" val="0"/>
-              </a:ext>
-            </a:extLst>
-          </a:blip>
-          <a:srcRect r="27156" b="32409"/>
-          <a:stretch/>
-        </p:blipFill>
-        <p:spPr>
-          <a:xfrm>
-            <a:off x="1654367" y="1069975"/>
-            <a:ext cx="7826303" cy="5000625"/>
-          </a:xfrm>
-        </p:spPr>
-      </p:pic>
       <p:sp>
         <p:nvSpPr>
           <p:cNvPr id="6" name="Szövegdoboz 5">
@@ -4721,8 +4688,8 @@
         </p:nvSpPr>
         <p:spPr>
           <a:xfrm>
-            <a:off x="1999456" y="745609"/>
-            <a:ext cx="2482056" cy="369332"/>
+            <a:off x="1226329" y="1052663"/>
+            <a:ext cx="3249608" cy="369332"/>
           </a:xfrm>
           <a:prstGeom prst="rect">
             <a:avLst/>
@@ -4743,7 +4710,10 @@
               <a:rPr lang="hu-HU" dirty="0" err="1"/>
               <a:t>Switch</a:t>
             </a:r>
-            <a:endParaRPr lang="hu-HU" dirty="0"/>
+            <a:r>
+              <a:rPr lang="hu-HU" dirty="0"/>
+              <a:t> – 1 Server</a:t>
+            </a:r>
           </a:p>
         </p:txBody>
       </p:sp>
@@ -4761,7 +4731,7 @@
         </p:nvSpPr>
         <p:spPr>
           <a:xfrm>
-            <a:off x="7073900" y="946150"/>
+            <a:off x="6426200" y="1140275"/>
             <a:ext cx="2266967" cy="369332"/>
           </a:xfrm>
           <a:prstGeom prst="rect">
@@ -4796,7 +4766,7 @@
         </p:nvSpPr>
         <p:spPr>
           <a:xfrm>
-            <a:off x="1028700" y="6025634"/>
+            <a:off x="119117" y="5529602"/>
             <a:ext cx="3121367" cy="369332"/>
           </a:xfrm>
           <a:prstGeom prst="rect">
@@ -4839,7 +4809,7 @@
         </p:nvSpPr>
         <p:spPr>
           <a:xfrm>
-            <a:off x="4150067" y="5752584"/>
+            <a:off x="3759400" y="5529602"/>
             <a:ext cx="3249608" cy="369332"/>
           </a:xfrm>
           <a:prstGeom prst="rect">
@@ -4882,7 +4852,7 @@
         </p:nvSpPr>
         <p:spPr>
           <a:xfrm>
-            <a:off x="6925012" y="5444093"/>
+            <a:off x="8251855" y="5489764"/>
             <a:ext cx="2397437" cy="369332"/>
           </a:xfrm>
           <a:prstGeom prst="rect">
@@ -4911,6 +4881,38 @@
           </a:p>
         </p:txBody>
       </p:sp>
+      <p:pic>
+        <p:nvPicPr>
+          <p:cNvPr id="11" name="Tartalom helye 10">
+            <a:extLst>
+              <a:ext uri="{FF2B5EF4-FFF2-40B4-BE49-F238E27FC236}">
+                <a16:creationId xmlns:a16="http://schemas.microsoft.com/office/drawing/2014/main" id="{4B4C5502-3C42-4222-99DF-51F6765526BD}"/>
+              </a:ext>
+            </a:extLst>
+          </p:cNvPr>
+          <p:cNvPicPr>
+            <a:picLocks noGrp="1" noChangeAspect="1"/>
+          </p:cNvPicPr>
+          <p:nvPr>
+            <p:ph idx="1"/>
+          </p:nvPr>
+        </p:nvPicPr>
+        <p:blipFill>
+          <a:blip r:embed="rId2"/>
+          <a:stretch>
+            <a:fillRect/>
+          </a:stretch>
+        </p:blipFill>
+        <p:spPr>
+          <a:xfrm>
+            <a:off x="1447800" y="1528507"/>
+            <a:ext cx="7872809" cy="4039411"/>
+          </a:xfrm>
+          <a:prstGeom prst="rect">
+            <a:avLst/>
+          </a:prstGeom>
+        </p:spPr>
+      </p:pic>
     </p:spTree>
     <p:extLst>
       <p:ext uri="{BB962C8B-B14F-4D97-AF65-F5344CB8AC3E}">
@@ -4925,6 +4927,99 @@
 </file>
 
 <file path=ppt/slides/slide6.xml><?xml version="1.0" encoding="utf-8"?>
+<p:sld xmlns:a="http://schemas.openxmlformats.org/drawingml/2006/main" xmlns:r="http://schemas.openxmlformats.org/officeDocument/2006/relationships" xmlns:p="http://schemas.openxmlformats.org/presentationml/2006/main">
+  <p:cSld>
+    <p:spTree>
+      <p:nvGrpSpPr>
+        <p:cNvPr id="1" name=""/>
+        <p:cNvGrpSpPr/>
+        <p:nvPr/>
+      </p:nvGrpSpPr>
+      <p:grpSpPr>
+        <a:xfrm>
+          <a:off x="0" y="0"/>
+          <a:ext cx="0" cy="0"/>
+          <a:chOff x="0" y="0"/>
+          <a:chExt cx="0" cy="0"/>
+        </a:xfrm>
+      </p:grpSpPr>
+      <p:sp>
+        <p:nvSpPr>
+          <p:cNvPr id="3" name="Tartalom helye 2">
+            <a:extLst>
+              <a:ext uri="{FF2B5EF4-FFF2-40B4-BE49-F238E27FC236}">
+                <a16:creationId xmlns:a16="http://schemas.microsoft.com/office/drawing/2014/main" id="{1E0C98E0-BD61-4B5E-B044-3633B6D3BE81}"/>
+              </a:ext>
+            </a:extLst>
+          </p:cNvPr>
+          <p:cNvSpPr>
+            <a:spLocks noGrp="1"/>
+          </p:cNvSpPr>
+          <p:nvPr>
+            <p:ph idx="1"/>
+          </p:nvPr>
+        </p:nvSpPr>
+        <p:spPr/>
+        <p:txBody>
+          <a:bodyPr/>
+          <a:lstStyle/>
+          <a:p>
+            <a:endParaRPr lang="hu-HU"/>
+          </a:p>
+        </p:txBody>
+      </p:sp>
+      <p:sp>
+        <p:nvSpPr>
+          <p:cNvPr id="5" name="Cím 1">
+            <a:extLst>
+              <a:ext uri="{FF2B5EF4-FFF2-40B4-BE49-F238E27FC236}">
+                <a16:creationId xmlns:a16="http://schemas.microsoft.com/office/drawing/2014/main" id="{EA39E1F0-6C6D-49D4-8E7B-0E1BD94D8A06}"/>
+              </a:ext>
+            </a:extLst>
+          </p:cNvPr>
+          <p:cNvSpPr>
+            <a:spLocks noGrp="1"/>
+          </p:cNvSpPr>
+          <p:nvPr>
+            <p:ph type="title"/>
+          </p:nvPr>
+        </p:nvSpPr>
+        <p:spPr>
+          <a:xfrm>
+            <a:off x="0" y="-165100"/>
+            <a:ext cx="4964112" cy="822325"/>
+          </a:xfrm>
+        </p:spPr>
+        <p:txBody>
+          <a:bodyPr>
+            <a:noAutofit/>
+          </a:bodyPr>
+          <a:lstStyle/>
+          <a:p>
+            <a:r>
+              <a:rPr lang="hu-HU" sz="4400" dirty="0">
+                <a:latin typeface="Times New Roman" panose="02020603050405020304" pitchFamily="18" charset="0"/>
+                <a:cs typeface="Times New Roman" panose="02020603050405020304" pitchFamily="18" charset="0"/>
+              </a:rPr>
+              <a:t>Használt</a:t>
+            </a:r>
+          </a:p>
+        </p:txBody>
+      </p:sp>
+    </p:spTree>
+    <p:extLst>
+      <p:ext uri="{BB962C8B-B14F-4D97-AF65-F5344CB8AC3E}">
+        <p14:creationId xmlns:p14="http://schemas.microsoft.com/office/powerpoint/2010/main" val="4263890678"/>
+      </p:ext>
+    </p:extLst>
+  </p:cSld>
+  <p:clrMapOvr>
+    <a:masterClrMapping/>
+  </p:clrMapOvr>
+</p:sld>
+</file>
+
+<file path=ppt/slides/slide7.xml><?xml version="1.0" encoding="utf-8"?>
 <p:sld xmlns:a="http://schemas.openxmlformats.org/drawingml/2006/main" xmlns:r="http://schemas.openxmlformats.org/officeDocument/2006/relationships" xmlns:p="http://schemas.openxmlformats.org/presentationml/2006/main">
   <p:cSld>
     <p:spTree>

</xml_diff>